<commit_message>
Update lecture and recap slides
</commit_message>
<xml_diff>
--- a/2015/recap_and_warmup_slides.pptx
+++ b/2015/recap_and_warmup_slides.pptx
@@ -6109,7 +6109,7 @@
           <a:graphicData uri="http://schemas.openxmlformats.org/presentationml/2006/ole">
             <mc:AlternateContent xmlns:mc="http://schemas.openxmlformats.org/markup-compatibility/2006">
               <mc:Choice xmlns:v="urn:schemas-microsoft-com:vml" Requires="v">
-                <p:oleObj spid="_x0000_s1871" r:id="rId15" imgW="1038370" imgH="980952" progId="">
+                <p:oleObj spid="_x0000_s1886" r:id="rId15" imgW="1038370" imgH="980952" progId="">
                   <p:embed/>
                 </p:oleObj>
               </mc:Choice>
@@ -6547,7 +6547,7 @@
                 </a:lnSpc>
                 <a:defRPr/>
               </a:pPr>
-              <a:t>07.09.2015</a:t>
+              <a:t>08.09.2015</a:t>
             </a:fld>
             <a:r>
               <a:rPr lang="en-GB" altLang="de-DE" sz="1000" smtClean="0">
@@ -10171,7 +10171,474 @@
               <a:rPr lang="en-US" dirty="0" err="1" smtClean="0"/>
               <a:t>gespeichert</a:t>
             </a:r>
-            <a:endParaRPr lang="en-US" smtClean="0"/>
+            <a:endParaRPr lang="en-US" dirty="0" smtClean="0"/>
+          </a:p>
+          <a:p>
+            <a:pPr marL="342900" indent="-342900">
+              <a:buFontTx/>
+              <a:buChar char="-"/>
+            </a:pPr>
+            <a:r>
+              <a:rPr lang="en-US" dirty="0" smtClean="0"/>
+              <a:t>C++-</a:t>
+            </a:r>
+            <a:r>
+              <a:rPr lang="en-US" dirty="0" err="1" smtClean="0"/>
+              <a:t>Fehler</a:t>
+            </a:r>
+            <a:r>
+              <a:rPr lang="en-US" dirty="0" smtClean="0"/>
+              <a:t> </a:t>
+            </a:r>
+            <a:r>
+              <a:rPr lang="en-US" dirty="0" err="1" smtClean="0"/>
+              <a:t>immer</a:t>
+            </a:r>
+            <a:r>
+              <a:rPr lang="en-US" dirty="0" smtClean="0"/>
+              <a:t> </a:t>
+            </a:r>
+            <a:r>
+              <a:rPr lang="en-US" b="1" dirty="0" smtClean="0"/>
+              <a:t>von </a:t>
+            </a:r>
+            <a:r>
+              <a:rPr lang="en-US" b="1" dirty="0" err="1" smtClean="0"/>
+              <a:t>oben</a:t>
+            </a:r>
+            <a:r>
+              <a:rPr lang="en-US" b="1" dirty="0" smtClean="0"/>
+              <a:t> </a:t>
+            </a:r>
+            <a:r>
+              <a:rPr lang="en-US" b="1" dirty="0" err="1" smtClean="0"/>
+              <a:t>nach</a:t>
+            </a:r>
+            <a:r>
+              <a:rPr lang="en-US" b="1" dirty="0" smtClean="0"/>
+              <a:t> </a:t>
+            </a:r>
+            <a:r>
+              <a:rPr lang="en-US" b="1" dirty="0" err="1" smtClean="0"/>
+              <a:t>unten</a:t>
+            </a:r>
+            <a:r>
+              <a:rPr lang="en-US" b="1" dirty="0" smtClean="0"/>
+              <a:t> </a:t>
+            </a:r>
+            <a:r>
+              <a:rPr lang="en-US" dirty="0" err="1" smtClean="0"/>
+              <a:t>durchgehen</a:t>
+            </a:r>
+            <a:endParaRPr lang="en-US" dirty="0" smtClean="0"/>
+          </a:p>
+          <a:p>
+            <a:pPr marL="342900" indent="-342900">
+              <a:buFontTx/>
+              <a:buChar char="-"/>
+            </a:pPr>
+            <a:r>
+              <a:rPr lang="en-US" dirty="0" err="1" smtClean="0"/>
+              <a:t>Veränderungen</a:t>
+            </a:r>
+            <a:r>
+              <a:rPr lang="en-US" dirty="0" smtClean="0"/>
+              <a:t> am </a:t>
+            </a:r>
+            <a:r>
+              <a:rPr lang="en-US" dirty="0" err="1" smtClean="0"/>
+              <a:t>Aufzugssimulator</a:t>
+            </a:r>
+            <a:r>
+              <a:rPr lang="en-US" dirty="0" smtClean="0"/>
+              <a:t> </a:t>
+            </a:r>
+            <a:r>
+              <a:rPr lang="en-US" b="1" dirty="0" err="1" smtClean="0"/>
+              <a:t>inkrementell</a:t>
+            </a:r>
+            <a:r>
+              <a:rPr lang="en-US" b="1" dirty="0" smtClean="0"/>
+              <a:t> </a:t>
+            </a:r>
+            <a:r>
+              <a:rPr lang="en-US" b="1" dirty="0" err="1" smtClean="0"/>
+              <a:t>durchführen</a:t>
+            </a:r>
+            <a:r>
+              <a:rPr lang="en-US" dirty="0" smtClean="0"/>
+              <a:t>, </a:t>
+            </a:r>
+            <a:r>
+              <a:rPr lang="en-US" dirty="0" err="1" smtClean="0"/>
+              <a:t>nicht</a:t>
+            </a:r>
+            <a:r>
+              <a:rPr lang="en-US" dirty="0" smtClean="0"/>
+              <a:t> </a:t>
+            </a:r>
+            <a:r>
+              <a:rPr lang="en-US" dirty="0" err="1" smtClean="0"/>
+              <a:t>alles</a:t>
+            </a:r>
+            <a:r>
+              <a:rPr lang="en-US" dirty="0" smtClean="0"/>
+              <a:t> auf </a:t>
+            </a:r>
+            <a:r>
+              <a:rPr lang="en-US" dirty="0" err="1" smtClean="0"/>
+              <a:t>einmal</a:t>
+            </a:r>
+            <a:endParaRPr lang="en-US" dirty="0" smtClean="0"/>
+          </a:p>
+          <a:p>
+            <a:pPr marL="342900" indent="-342900">
+              <a:buFontTx/>
+              <a:buChar char="-"/>
+            </a:pPr>
+            <a:r>
+              <a:rPr lang="en-US" dirty="0" err="1" smtClean="0"/>
+              <a:t>Probleme</a:t>
+            </a:r>
+            <a:r>
+              <a:rPr lang="en-US" dirty="0" smtClean="0"/>
+              <a:t> </a:t>
+            </a:r>
+            <a:r>
+              <a:rPr lang="en-US" dirty="0" err="1" smtClean="0"/>
+              <a:t>mit</a:t>
+            </a:r>
+            <a:r>
+              <a:rPr lang="en-US" dirty="0" smtClean="0"/>
+              <a:t> </a:t>
+            </a:r>
+            <a:r>
+              <a:rPr lang="en-US" dirty="0" err="1" smtClean="0">
+                <a:latin typeface="Consolas" panose="020B0609020204030204" pitchFamily="49" charset="0"/>
+                <a:cs typeface="Consolas" panose="020B0609020204030204" pitchFamily="49" charset="0"/>
+              </a:rPr>
+              <a:t>typedef</a:t>
+            </a:r>
+            <a:r>
+              <a:rPr lang="en-US" dirty="0" smtClean="0">
+                <a:latin typeface="Consolas" panose="020B0609020204030204" pitchFamily="49" charset="0"/>
+                <a:cs typeface="Consolas" panose="020B0609020204030204" pitchFamily="49" charset="0"/>
+              </a:rPr>
+              <a:t> </a:t>
+            </a:r>
+            <a:r>
+              <a:rPr lang="en-US" dirty="0" err="1" smtClean="0">
+                <a:latin typeface="Consolas" panose="020B0609020204030204" pitchFamily="49" charset="0"/>
+                <a:cs typeface="Consolas" panose="020B0609020204030204" pitchFamily="49" charset="0"/>
+              </a:rPr>
+              <a:t>std</a:t>
+            </a:r>
+            <a:r>
+              <a:rPr lang="en-US" dirty="0" smtClean="0">
+                <a:latin typeface="Consolas" panose="020B0609020204030204" pitchFamily="49" charset="0"/>
+                <a:cs typeface="Consolas" panose="020B0609020204030204" pitchFamily="49" charset="0"/>
+              </a:rPr>
+              <a:t>::</a:t>
+            </a:r>
+            <a:r>
+              <a:rPr lang="en-US" dirty="0" err="1" smtClean="0">
+                <a:latin typeface="Consolas" panose="020B0609020204030204" pitchFamily="49" charset="0"/>
+                <a:cs typeface="Consolas" panose="020B0609020204030204" pitchFamily="49" charset="0"/>
+              </a:rPr>
+              <a:t>shared_ptr</a:t>
+            </a:r>
+            <a:r>
+              <a:rPr lang="en-US" dirty="0" smtClean="0">
+                <a:latin typeface="Consolas" panose="020B0609020204030204" pitchFamily="49" charset="0"/>
+                <a:cs typeface="Consolas" panose="020B0609020204030204" pitchFamily="49" charset="0"/>
+              </a:rPr>
+              <a:t>&lt;Person&gt; </a:t>
+            </a:r>
+            <a:r>
+              <a:rPr lang="en-US" dirty="0" err="1" smtClean="0">
+                <a:latin typeface="Consolas" panose="020B0609020204030204" pitchFamily="49" charset="0"/>
+                <a:cs typeface="Consolas" panose="020B0609020204030204" pitchFamily="49" charset="0"/>
+              </a:rPr>
+              <a:t>PersonPtr</a:t>
+            </a:r>
+            <a:endParaRPr lang="en-US" dirty="0" smtClean="0">
+              <a:latin typeface="Consolas" panose="020B0609020204030204" pitchFamily="49" charset="0"/>
+              <a:cs typeface="Consolas" panose="020B0609020204030204" pitchFamily="49" charset="0"/>
+            </a:endParaRPr>
+          </a:p>
+          <a:p>
+            <a:pPr marL="692150" lvl="1" indent="-342900">
+              <a:buFontTx/>
+              <a:buChar char="-"/>
+            </a:pPr>
+            <a:r>
+              <a:rPr lang="en-US" dirty="0" err="1" smtClean="0"/>
+              <a:t>Es</a:t>
+            </a:r>
+            <a:r>
+              <a:rPr lang="en-US" dirty="0" smtClean="0"/>
+              <a:t> </a:t>
+            </a:r>
+            <a:r>
+              <a:rPr lang="en-US" dirty="0" err="1" smtClean="0"/>
+              <a:t>gibt</a:t>
+            </a:r>
+            <a:r>
+              <a:rPr lang="en-US" dirty="0" smtClean="0"/>
+              <a:t> </a:t>
+            </a:r>
+            <a:r>
+              <a:rPr lang="en-US" dirty="0" err="1" smtClean="0"/>
+              <a:t>eine</a:t>
+            </a:r>
+            <a:r>
+              <a:rPr lang="en-US" dirty="0" smtClean="0"/>
+              <a:t> </a:t>
+            </a:r>
+            <a:r>
+              <a:rPr lang="en-US" dirty="0" err="1" smtClean="0"/>
+              <a:t>Lösung</a:t>
+            </a:r>
+            <a:r>
+              <a:rPr lang="en-US" dirty="0" smtClean="0"/>
+              <a:t>! </a:t>
+            </a:r>
+            <a:r>
+              <a:rPr lang="en-US" dirty="0" smtClean="0">
+                <a:sym typeface="Wingdings" panose="05000000000000000000" pitchFamily="2" charset="2"/>
+              </a:rPr>
+              <a:t> </a:t>
+            </a:r>
+          </a:p>
+          <a:p>
+            <a:pPr marL="692150" lvl="1" indent="-342900">
+              <a:buFontTx/>
+              <a:buChar char="-"/>
+            </a:pPr>
+            <a:r>
+              <a:rPr lang="en-US" b="1" dirty="0" smtClean="0">
+                <a:sym typeface="Wingdings" panose="05000000000000000000" pitchFamily="2" charset="2"/>
+              </a:rPr>
+              <a:t>Window -&gt; Preferences -&gt; C/C++ / Code Analysis -&gt; Syntax and Semantic Errors </a:t>
+            </a:r>
+            <a:r>
+              <a:rPr lang="en-US" b="1" dirty="0" err="1" smtClean="0">
+                <a:sym typeface="Wingdings" panose="05000000000000000000" pitchFamily="2" charset="2"/>
+              </a:rPr>
+              <a:t>deaktivieren</a:t>
+            </a:r>
+            <a:r>
+              <a:rPr lang="en-US" b="1" dirty="0" smtClean="0">
+                <a:sym typeface="Wingdings" panose="05000000000000000000" pitchFamily="2" charset="2"/>
+              </a:rPr>
+              <a:t> </a:t>
+            </a:r>
+            <a:r>
+              <a:rPr lang="en-US" dirty="0" smtClean="0">
+                <a:sym typeface="Wingdings" panose="05000000000000000000" pitchFamily="2" charset="2"/>
+              </a:rPr>
+              <a:t>(</a:t>
+            </a:r>
+            <a:r>
+              <a:rPr lang="en-US" dirty="0" err="1" smtClean="0">
+                <a:sym typeface="Wingdings" panose="05000000000000000000" pitchFamily="2" charset="2"/>
+              </a:rPr>
+              <a:t>oder</a:t>
+            </a:r>
+            <a:r>
+              <a:rPr lang="en-US" dirty="0" smtClean="0">
+                <a:sym typeface="Wingdings" panose="05000000000000000000" pitchFamily="2" charset="2"/>
+              </a:rPr>
+              <a:t> </a:t>
+            </a:r>
+            <a:r>
+              <a:rPr lang="en-US" dirty="0" err="1" smtClean="0">
+                <a:sym typeface="Wingdings" panose="05000000000000000000" pitchFamily="2" charset="2"/>
+              </a:rPr>
+              <a:t>auch</a:t>
+            </a:r>
+            <a:r>
+              <a:rPr lang="en-US" dirty="0" smtClean="0">
+                <a:sym typeface="Wingdings" panose="05000000000000000000" pitchFamily="2" charset="2"/>
+              </a:rPr>
+              <a:t> </a:t>
+            </a:r>
+            <a:r>
+              <a:rPr lang="en-US" dirty="0" err="1" smtClean="0">
+                <a:sym typeface="Wingdings" panose="05000000000000000000" pitchFamily="2" charset="2"/>
+              </a:rPr>
+              <a:t>feingranularar</a:t>
+            </a:r>
+            <a:r>
+              <a:rPr lang="en-US" dirty="0" smtClean="0">
+                <a:sym typeface="Wingdings" panose="05000000000000000000" pitchFamily="2" charset="2"/>
+              </a:rPr>
+              <a:t>)</a:t>
+            </a:r>
+            <a:endParaRPr lang="en-US" b="1" dirty="0" smtClean="0"/>
+          </a:p>
+          <a:p>
+            <a:pPr marL="342900" indent="-342900">
+              <a:buFontTx/>
+              <a:buChar char="-"/>
+            </a:pPr>
+            <a:r>
+              <a:rPr lang="en-US" dirty="0" smtClean="0"/>
+              <a:t>Updates (Pull </a:t>
+            </a:r>
+            <a:r>
+              <a:rPr lang="en-US" dirty="0" smtClean="0">
+                <a:sym typeface="Wingdings" panose="05000000000000000000" pitchFamily="2" charset="2"/>
+              </a:rPr>
+              <a:t> )</a:t>
+            </a:r>
+          </a:p>
+          <a:p>
+            <a:pPr marL="692150" lvl="1" indent="-342900">
+              <a:buFontTx/>
+              <a:buChar char="-"/>
+            </a:pPr>
+            <a:r>
+              <a:rPr lang="en-US" dirty="0" err="1" smtClean="0">
+                <a:sym typeface="Wingdings" panose="05000000000000000000" pitchFamily="2" charset="2"/>
+              </a:rPr>
+              <a:t>Korrektur</a:t>
+            </a:r>
+            <a:r>
+              <a:rPr lang="en-US" dirty="0" smtClean="0">
+                <a:sym typeface="Wingdings" panose="05000000000000000000" pitchFamily="2" charset="2"/>
+              </a:rPr>
+              <a:t> an </a:t>
+            </a:r>
+            <a:r>
+              <a:rPr lang="en-US" dirty="0" err="1" smtClean="0">
+                <a:sym typeface="Wingdings" panose="05000000000000000000" pitchFamily="2" charset="2"/>
+              </a:rPr>
+              <a:t>Folie</a:t>
+            </a:r>
+            <a:r>
+              <a:rPr lang="en-US" dirty="0" smtClean="0">
+                <a:sym typeface="Wingdings" panose="05000000000000000000" pitchFamily="2" charset="2"/>
+              </a:rPr>
+              <a:t> 118 (</a:t>
+            </a:r>
+            <a:r>
+              <a:rPr lang="en-US" dirty="0" err="1" smtClean="0">
+                <a:sym typeface="Wingdings" panose="05000000000000000000" pitchFamily="2" charset="2"/>
+              </a:rPr>
+              <a:t>korrigierter</a:t>
+            </a:r>
+            <a:r>
+              <a:rPr lang="en-US" dirty="0" smtClean="0">
+                <a:sym typeface="Wingdings" panose="05000000000000000000" pitchFamily="2" charset="2"/>
+              </a:rPr>
+              <a:t> Code </a:t>
+            </a:r>
+            <a:r>
+              <a:rPr lang="en-US" dirty="0" err="1" smtClean="0">
+                <a:sym typeface="Wingdings" panose="05000000000000000000" pitchFamily="2" charset="2"/>
+              </a:rPr>
+              <a:t>für</a:t>
+            </a:r>
+            <a:r>
+              <a:rPr lang="en-US" dirty="0" smtClean="0">
+                <a:sym typeface="Wingdings" panose="05000000000000000000" pitchFamily="2" charset="2"/>
+              </a:rPr>
+              <a:t> </a:t>
+            </a:r>
+            <a:r>
+              <a:rPr lang="en-US" dirty="0" err="1" smtClean="0">
+                <a:sym typeface="Wingdings" panose="05000000000000000000" pitchFamily="2" charset="2"/>
+              </a:rPr>
+              <a:t>Mehrfachvererbung</a:t>
+            </a:r>
+            <a:r>
+              <a:rPr lang="en-US" dirty="0" smtClean="0">
+                <a:sym typeface="Wingdings" panose="05000000000000000000" pitchFamily="2" charset="2"/>
+              </a:rPr>
+              <a:t>)</a:t>
+            </a:r>
+          </a:p>
+          <a:p>
+            <a:pPr marL="692150" lvl="1" indent="-342900">
+              <a:buFontTx/>
+              <a:buChar char="-"/>
+            </a:pPr>
+            <a:r>
+              <a:rPr lang="en-US" dirty="0" err="1" smtClean="0">
+                <a:sym typeface="Wingdings" panose="05000000000000000000" pitchFamily="2" charset="2"/>
+              </a:rPr>
+              <a:t>ExpressionTree-Aufgabe</a:t>
+            </a:r>
+            <a:r>
+              <a:rPr lang="en-US" dirty="0" smtClean="0">
+                <a:sym typeface="Wingdings" panose="05000000000000000000" pitchFamily="2" charset="2"/>
+              </a:rPr>
+              <a:t> </a:t>
+            </a:r>
+            <a:r>
+              <a:rPr lang="en-US" dirty="0" err="1" smtClean="0">
+                <a:sym typeface="Wingdings" panose="05000000000000000000" pitchFamily="2" charset="2"/>
+              </a:rPr>
+              <a:t>überarbeitet</a:t>
+            </a:r>
+            <a:r>
+              <a:rPr lang="en-US" dirty="0" smtClean="0">
+                <a:sym typeface="Wingdings" panose="05000000000000000000" pitchFamily="2" charset="2"/>
+              </a:rPr>
+              <a:t> (</a:t>
+            </a:r>
+            <a:r>
+              <a:rPr lang="en-US" dirty="0" err="1" smtClean="0">
+                <a:sym typeface="Wingdings" panose="05000000000000000000" pitchFamily="2" charset="2"/>
+              </a:rPr>
+              <a:t>kein</a:t>
+            </a:r>
+            <a:r>
+              <a:rPr lang="en-US" dirty="0" smtClean="0">
+                <a:sym typeface="Wingdings" panose="05000000000000000000" pitchFamily="2" charset="2"/>
+              </a:rPr>
+              <a:t> </a:t>
+            </a:r>
+            <a:r>
+              <a:rPr lang="en-US" dirty="0" smtClean="0">
+                <a:latin typeface="Consolas" panose="020B0609020204030204" pitchFamily="49" charset="0"/>
+                <a:cs typeface="Consolas" panose="020B0609020204030204" pitchFamily="49" charset="0"/>
+                <a:sym typeface="Wingdings" panose="05000000000000000000" pitchFamily="2" charset="2"/>
+              </a:rPr>
+              <a:t>delete</a:t>
+            </a:r>
+            <a:r>
+              <a:rPr lang="en-US" dirty="0" smtClean="0">
+                <a:sym typeface="Wingdings" panose="05000000000000000000" pitchFamily="2" charset="2"/>
+              </a:rPr>
+              <a:t> </a:t>
+            </a:r>
+            <a:r>
+              <a:rPr lang="en-US" dirty="0" err="1" smtClean="0">
+                <a:sym typeface="Wingdings" panose="05000000000000000000" pitchFamily="2" charset="2"/>
+              </a:rPr>
+              <a:t>mehr</a:t>
+            </a:r>
+            <a:r>
+              <a:rPr lang="en-US" dirty="0" smtClean="0">
+                <a:sym typeface="Wingdings" panose="05000000000000000000" pitchFamily="2" charset="2"/>
+              </a:rPr>
+              <a:t> </a:t>
+            </a:r>
+            <a:r>
+              <a:rPr lang="en-US" dirty="0" err="1" smtClean="0">
+                <a:sym typeface="Wingdings" panose="05000000000000000000" pitchFamily="2" charset="2"/>
+              </a:rPr>
+              <a:t>im</a:t>
+            </a:r>
+            <a:r>
+              <a:rPr lang="en-US" dirty="0" smtClean="0">
+                <a:sym typeface="Wingdings" panose="05000000000000000000" pitchFamily="2" charset="2"/>
+              </a:rPr>
+              <a:t> Destruktor)</a:t>
+            </a:r>
+            <a:endParaRPr lang="en-US" dirty="0" smtClean="0"/>
           </a:p>
           <a:p>
             <a:pPr marL="342900" indent="-342900">
@@ -10179,6 +10646,134 @@
               <a:buChar char="-"/>
             </a:pPr>
             <a:endParaRPr lang="en-US" dirty="0"/>
+          </a:p>
+        </p:txBody>
+      </p:sp>
+      <p:sp>
+        <p:nvSpPr>
+          <p:cNvPr id="4" name="Abgerundete rechteckige Legende 3"/>
+          <p:cNvSpPr/>
+          <p:nvPr/>
+        </p:nvSpPr>
+        <p:spPr bwMode="auto">
+          <a:xfrm>
+            <a:off x="5364088" y="430586"/>
+            <a:ext cx="1656184" cy="767232"/>
+          </a:xfrm>
+          <a:prstGeom prst="wedgeRoundRectCallout">
+            <a:avLst>
+              <a:gd name="adj1" fmla="val -65625"/>
+              <a:gd name="adj2" fmla="val -1353"/>
+              <a:gd name="adj3" fmla="val 16667"/>
+            </a:avLst>
+          </a:prstGeom>
+          <a:solidFill>
+            <a:schemeClr val="tx1"/>
+          </a:solidFill>
+          <a:ln w="9525">
+            <a:solidFill>
+              <a:srgbClr val="000000"/>
+            </a:solidFill>
+            <a:miter lim="800000"/>
+            <a:headEnd/>
+            <a:tailEnd/>
+          </a:ln>
+          <a:extLst/>
+        </p:spPr>
+        <p:txBody>
+          <a:bodyPr wrap="square" rtlCol="0" anchor="ctr">
+            <a:spAutoFit/>
+          </a:bodyPr>
+          <a:lstStyle/>
+          <a:p>
+            <a:pPr algn="l"/>
+            <a:r>
+              <a:rPr lang="en-US" sz="1400" b="1" dirty="0" smtClean="0">
+                <a:solidFill>
+                  <a:schemeClr val="bg1"/>
+                </a:solidFill>
+                <a:latin typeface="Segoe UI" panose="020B0502040204020203" pitchFamily="34" charset="0"/>
+              </a:rPr>
+              <a:t>Die </a:t>
+            </a:r>
+            <a:r>
+              <a:rPr lang="en-US" sz="1400" b="1" dirty="0" err="1" smtClean="0">
+                <a:solidFill>
+                  <a:schemeClr val="bg1"/>
+                </a:solidFill>
+                <a:latin typeface="Segoe UI" panose="020B0502040204020203" pitchFamily="34" charset="0"/>
+              </a:rPr>
+              <a:t>Folien</a:t>
+            </a:r>
+            <a:r>
+              <a:rPr lang="en-US" sz="1400" b="1" dirty="0" smtClean="0">
+                <a:solidFill>
+                  <a:schemeClr val="bg1"/>
+                </a:solidFill>
+                <a:latin typeface="Segoe UI" panose="020B0502040204020203" pitchFamily="34" charset="0"/>
+              </a:rPr>
+              <a:t> </a:t>
+            </a:r>
+            <a:r>
+              <a:rPr lang="en-US" sz="1400" b="1" dirty="0" err="1" smtClean="0">
+                <a:solidFill>
+                  <a:schemeClr val="bg1"/>
+                </a:solidFill>
+                <a:latin typeface="Segoe UI" panose="020B0502040204020203" pitchFamily="34" charset="0"/>
+              </a:rPr>
+              <a:t>sind</a:t>
+            </a:r>
+            <a:r>
+              <a:rPr lang="en-US" sz="1400" b="1" dirty="0" smtClean="0">
+                <a:solidFill>
+                  <a:schemeClr val="bg1"/>
+                </a:solidFill>
+                <a:latin typeface="Segoe UI" panose="020B0502040204020203" pitchFamily="34" charset="0"/>
+              </a:rPr>
+              <a:t> </a:t>
+            </a:r>
+            <a:r>
+              <a:rPr lang="en-US" sz="1400" b="1" dirty="0" err="1" smtClean="0">
+                <a:solidFill>
+                  <a:schemeClr val="bg1"/>
+                </a:solidFill>
+                <a:latin typeface="Segoe UI" panose="020B0502040204020203" pitchFamily="34" charset="0"/>
+              </a:rPr>
+              <a:t>auch</a:t>
+            </a:r>
+            <a:r>
+              <a:rPr lang="en-US" sz="1400" b="1" dirty="0" smtClean="0">
+                <a:solidFill>
+                  <a:schemeClr val="bg1"/>
+                </a:solidFill>
+                <a:latin typeface="Segoe UI" panose="020B0502040204020203" pitchFamily="34" charset="0"/>
+              </a:rPr>
+              <a:t> </a:t>
+            </a:r>
+            <a:r>
+              <a:rPr lang="en-US" sz="1400" b="1" dirty="0" err="1" smtClean="0">
+                <a:solidFill>
+                  <a:schemeClr val="bg1"/>
+                </a:solidFill>
+                <a:latin typeface="Segoe UI" panose="020B0502040204020203" pitchFamily="34" charset="0"/>
+              </a:rPr>
+              <a:t>im</a:t>
+            </a:r>
+            <a:r>
+              <a:rPr lang="en-US" sz="1400" b="1" dirty="0" smtClean="0">
+                <a:solidFill>
+                  <a:schemeClr val="bg1"/>
+                </a:solidFill>
+                <a:latin typeface="Segoe UI" panose="020B0502040204020203" pitchFamily="34" charset="0"/>
+              </a:rPr>
+              <a:t> “lecture” Repo.</a:t>
+            </a:r>
+            <a:endParaRPr lang="en-US" sz="1400" b="1" dirty="0">
+              <a:solidFill>
+                <a:schemeClr val="bg1"/>
+              </a:solidFill>
+              <a:latin typeface="Consolas" pitchFamily="49" charset="0"/>
+            </a:endParaRPr>
           </a:p>
         </p:txBody>
       </p:sp>
@@ -10192,6 +10787,405 @@
   <p:clrMapOvr>
     <a:masterClrMapping/>
   </p:clrMapOvr>
+  <p:timing>
+    <p:tnLst>
+      <p:par>
+        <p:cTn id="1" dur="indefinite" restart="never" nodeType="tmRoot">
+          <p:childTnLst>
+            <p:seq concurrent="1" nextAc="seek">
+              <p:cTn id="2" dur="indefinite" nodeType="mainSeq">
+                <p:childTnLst>
+                  <p:par>
+                    <p:cTn id="3" fill="hold">
+                      <p:stCondLst>
+                        <p:cond delay="indefinite"/>
+                      </p:stCondLst>
+                      <p:childTnLst>
+                        <p:par>
+                          <p:cTn id="4" fill="hold">
+                            <p:stCondLst>
+                              <p:cond delay="0"/>
+                            </p:stCondLst>
+                            <p:childTnLst>
+                              <p:par>
+                                <p:cTn id="5" presetID="1" presetClass="entr" presetSubtype="0" fill="hold" nodeType="clickEffect">
+                                  <p:stCondLst>
+                                    <p:cond delay="0"/>
+                                  </p:stCondLst>
+                                  <p:childTnLst>
+                                    <p:set>
+                                      <p:cBhvr>
+                                        <p:cTn id="6" dur="1" fill="hold">
+                                          <p:stCondLst>
+                                            <p:cond delay="0"/>
+                                          </p:stCondLst>
+                                        </p:cTn>
+                                        <p:tgtEl>
+                                          <p:spTgt spid="3">
+                                            <p:txEl>
+                                              <p:pRg st="0" end="0"/>
+                                            </p:txEl>
+                                          </p:spTgt>
+                                        </p:tgtEl>
+                                        <p:attrNameLst>
+                                          <p:attrName>style.visibility</p:attrName>
+                                        </p:attrNameLst>
+                                      </p:cBhvr>
+                                      <p:to>
+                                        <p:strVal val="visible"/>
+                                      </p:to>
+                                    </p:set>
+                                  </p:childTnLst>
+                                </p:cTn>
+                              </p:par>
+                            </p:childTnLst>
+                          </p:cTn>
+                        </p:par>
+                      </p:childTnLst>
+                    </p:cTn>
+                  </p:par>
+                  <p:par>
+                    <p:cTn id="7" fill="hold">
+                      <p:stCondLst>
+                        <p:cond delay="indefinite"/>
+                      </p:stCondLst>
+                      <p:childTnLst>
+                        <p:par>
+                          <p:cTn id="8" fill="hold">
+                            <p:stCondLst>
+                              <p:cond delay="0"/>
+                            </p:stCondLst>
+                            <p:childTnLst>
+                              <p:par>
+                                <p:cTn id="9" presetID="1" presetClass="entr" presetSubtype="0" fill="hold" nodeType="clickEffect">
+                                  <p:stCondLst>
+                                    <p:cond delay="0"/>
+                                  </p:stCondLst>
+                                  <p:childTnLst>
+                                    <p:set>
+                                      <p:cBhvr>
+                                        <p:cTn id="10" dur="1" fill="hold">
+                                          <p:stCondLst>
+                                            <p:cond delay="0"/>
+                                          </p:stCondLst>
+                                        </p:cTn>
+                                        <p:tgtEl>
+                                          <p:spTgt spid="3">
+                                            <p:txEl>
+                                              <p:pRg st="1" end="1"/>
+                                            </p:txEl>
+                                          </p:spTgt>
+                                        </p:tgtEl>
+                                        <p:attrNameLst>
+                                          <p:attrName>style.visibility</p:attrName>
+                                        </p:attrNameLst>
+                                      </p:cBhvr>
+                                      <p:to>
+                                        <p:strVal val="visible"/>
+                                      </p:to>
+                                    </p:set>
+                                  </p:childTnLst>
+                                </p:cTn>
+                              </p:par>
+                            </p:childTnLst>
+                          </p:cTn>
+                        </p:par>
+                      </p:childTnLst>
+                    </p:cTn>
+                  </p:par>
+                  <p:par>
+                    <p:cTn id="11" fill="hold">
+                      <p:stCondLst>
+                        <p:cond delay="indefinite"/>
+                      </p:stCondLst>
+                      <p:childTnLst>
+                        <p:par>
+                          <p:cTn id="12" fill="hold">
+                            <p:stCondLst>
+                              <p:cond delay="0"/>
+                            </p:stCondLst>
+                            <p:childTnLst>
+                              <p:par>
+                                <p:cTn id="13" presetID="1" presetClass="entr" presetSubtype="0" fill="hold" nodeType="clickEffect">
+                                  <p:stCondLst>
+                                    <p:cond delay="0"/>
+                                  </p:stCondLst>
+                                  <p:childTnLst>
+                                    <p:set>
+                                      <p:cBhvr>
+                                        <p:cTn id="14" dur="1" fill="hold">
+                                          <p:stCondLst>
+                                            <p:cond delay="0"/>
+                                          </p:stCondLst>
+                                        </p:cTn>
+                                        <p:tgtEl>
+                                          <p:spTgt spid="3">
+                                            <p:txEl>
+                                              <p:pRg st="2" end="2"/>
+                                            </p:txEl>
+                                          </p:spTgt>
+                                        </p:tgtEl>
+                                        <p:attrNameLst>
+                                          <p:attrName>style.visibility</p:attrName>
+                                        </p:attrNameLst>
+                                      </p:cBhvr>
+                                      <p:to>
+                                        <p:strVal val="visible"/>
+                                      </p:to>
+                                    </p:set>
+                                  </p:childTnLst>
+                                </p:cTn>
+                              </p:par>
+                            </p:childTnLst>
+                          </p:cTn>
+                        </p:par>
+                      </p:childTnLst>
+                    </p:cTn>
+                  </p:par>
+                  <p:par>
+                    <p:cTn id="15" fill="hold">
+                      <p:stCondLst>
+                        <p:cond delay="indefinite"/>
+                      </p:stCondLst>
+                      <p:childTnLst>
+                        <p:par>
+                          <p:cTn id="16" fill="hold">
+                            <p:stCondLst>
+                              <p:cond delay="0"/>
+                            </p:stCondLst>
+                            <p:childTnLst>
+                              <p:par>
+                                <p:cTn id="17" presetID="1" presetClass="entr" presetSubtype="0" fill="hold" nodeType="clickEffect">
+                                  <p:stCondLst>
+                                    <p:cond delay="0"/>
+                                  </p:stCondLst>
+                                  <p:childTnLst>
+                                    <p:set>
+                                      <p:cBhvr>
+                                        <p:cTn id="18" dur="1" fill="hold">
+                                          <p:stCondLst>
+                                            <p:cond delay="0"/>
+                                          </p:stCondLst>
+                                        </p:cTn>
+                                        <p:tgtEl>
+                                          <p:spTgt spid="3">
+                                            <p:txEl>
+                                              <p:pRg st="3" end="3"/>
+                                            </p:txEl>
+                                          </p:spTgt>
+                                        </p:tgtEl>
+                                        <p:attrNameLst>
+                                          <p:attrName>style.visibility</p:attrName>
+                                        </p:attrNameLst>
+                                      </p:cBhvr>
+                                      <p:to>
+                                        <p:strVal val="visible"/>
+                                      </p:to>
+                                    </p:set>
+                                  </p:childTnLst>
+                                </p:cTn>
+                              </p:par>
+                              <p:par>
+                                <p:cTn id="19" presetID="1" presetClass="entr" presetSubtype="0" fill="hold" nodeType="withEffect">
+                                  <p:stCondLst>
+                                    <p:cond delay="0"/>
+                                  </p:stCondLst>
+                                  <p:childTnLst>
+                                    <p:set>
+                                      <p:cBhvr>
+                                        <p:cTn id="20" dur="1" fill="hold">
+                                          <p:stCondLst>
+                                            <p:cond delay="0"/>
+                                          </p:stCondLst>
+                                        </p:cTn>
+                                        <p:tgtEl>
+                                          <p:spTgt spid="3">
+                                            <p:txEl>
+                                              <p:pRg st="4" end="4"/>
+                                            </p:txEl>
+                                          </p:spTgt>
+                                        </p:tgtEl>
+                                        <p:attrNameLst>
+                                          <p:attrName>style.visibility</p:attrName>
+                                        </p:attrNameLst>
+                                      </p:cBhvr>
+                                      <p:to>
+                                        <p:strVal val="visible"/>
+                                      </p:to>
+                                    </p:set>
+                                  </p:childTnLst>
+                                </p:cTn>
+                              </p:par>
+                              <p:par>
+                                <p:cTn id="21" presetID="1" presetClass="entr" presetSubtype="0" fill="hold" nodeType="withEffect">
+                                  <p:stCondLst>
+                                    <p:cond delay="0"/>
+                                  </p:stCondLst>
+                                  <p:childTnLst>
+                                    <p:set>
+                                      <p:cBhvr>
+                                        <p:cTn id="22" dur="1" fill="hold">
+                                          <p:stCondLst>
+                                            <p:cond delay="0"/>
+                                          </p:stCondLst>
+                                        </p:cTn>
+                                        <p:tgtEl>
+                                          <p:spTgt spid="3">
+                                            <p:txEl>
+                                              <p:pRg st="5" end="5"/>
+                                            </p:txEl>
+                                          </p:spTgt>
+                                        </p:tgtEl>
+                                        <p:attrNameLst>
+                                          <p:attrName>style.visibility</p:attrName>
+                                        </p:attrNameLst>
+                                      </p:cBhvr>
+                                      <p:to>
+                                        <p:strVal val="visible"/>
+                                      </p:to>
+                                    </p:set>
+                                  </p:childTnLst>
+                                </p:cTn>
+                              </p:par>
+                            </p:childTnLst>
+                          </p:cTn>
+                        </p:par>
+                      </p:childTnLst>
+                    </p:cTn>
+                  </p:par>
+                  <p:par>
+                    <p:cTn id="23" fill="hold">
+                      <p:stCondLst>
+                        <p:cond delay="indefinite"/>
+                      </p:stCondLst>
+                      <p:childTnLst>
+                        <p:par>
+                          <p:cTn id="24" fill="hold">
+                            <p:stCondLst>
+                              <p:cond delay="0"/>
+                            </p:stCondLst>
+                            <p:childTnLst>
+                              <p:par>
+                                <p:cTn id="25" presetID="1" presetClass="entr" presetSubtype="0" fill="hold" nodeType="clickEffect">
+                                  <p:stCondLst>
+                                    <p:cond delay="0"/>
+                                  </p:stCondLst>
+                                  <p:childTnLst>
+                                    <p:set>
+                                      <p:cBhvr>
+                                        <p:cTn id="26" dur="1" fill="hold">
+                                          <p:stCondLst>
+                                            <p:cond delay="0"/>
+                                          </p:stCondLst>
+                                        </p:cTn>
+                                        <p:tgtEl>
+                                          <p:spTgt spid="3">
+                                            <p:txEl>
+                                              <p:pRg st="6" end="6"/>
+                                            </p:txEl>
+                                          </p:spTgt>
+                                        </p:tgtEl>
+                                        <p:attrNameLst>
+                                          <p:attrName>style.visibility</p:attrName>
+                                        </p:attrNameLst>
+                                      </p:cBhvr>
+                                      <p:to>
+                                        <p:strVal val="visible"/>
+                                      </p:to>
+                                    </p:set>
+                                  </p:childTnLst>
+                                </p:cTn>
+                              </p:par>
+                              <p:par>
+                                <p:cTn id="27" presetID="1" presetClass="entr" presetSubtype="0" fill="hold" nodeType="withEffect">
+                                  <p:stCondLst>
+                                    <p:cond delay="0"/>
+                                  </p:stCondLst>
+                                  <p:childTnLst>
+                                    <p:set>
+                                      <p:cBhvr>
+                                        <p:cTn id="28" dur="1" fill="hold">
+                                          <p:stCondLst>
+                                            <p:cond delay="0"/>
+                                          </p:stCondLst>
+                                        </p:cTn>
+                                        <p:tgtEl>
+                                          <p:spTgt spid="3">
+                                            <p:txEl>
+                                              <p:pRg st="7" end="7"/>
+                                            </p:txEl>
+                                          </p:spTgt>
+                                        </p:tgtEl>
+                                        <p:attrNameLst>
+                                          <p:attrName>style.visibility</p:attrName>
+                                        </p:attrNameLst>
+                                      </p:cBhvr>
+                                      <p:to>
+                                        <p:strVal val="visible"/>
+                                      </p:to>
+                                    </p:set>
+                                  </p:childTnLst>
+                                </p:cTn>
+                              </p:par>
+                              <p:par>
+                                <p:cTn id="29" presetID="1" presetClass="entr" presetSubtype="0" fill="hold" nodeType="withEffect">
+                                  <p:stCondLst>
+                                    <p:cond delay="0"/>
+                                  </p:stCondLst>
+                                  <p:childTnLst>
+                                    <p:set>
+                                      <p:cBhvr>
+                                        <p:cTn id="30" dur="1" fill="hold">
+                                          <p:stCondLst>
+                                            <p:cond delay="0"/>
+                                          </p:stCondLst>
+                                        </p:cTn>
+                                        <p:tgtEl>
+                                          <p:spTgt spid="3">
+                                            <p:txEl>
+                                              <p:pRg st="8" end="8"/>
+                                            </p:txEl>
+                                          </p:spTgt>
+                                        </p:tgtEl>
+                                        <p:attrNameLst>
+                                          <p:attrName>style.visibility</p:attrName>
+                                        </p:attrNameLst>
+                                      </p:cBhvr>
+                                      <p:to>
+                                        <p:strVal val="visible"/>
+                                      </p:to>
+                                    </p:set>
+                                  </p:childTnLst>
+                                </p:cTn>
+                              </p:par>
+                            </p:childTnLst>
+                          </p:cTn>
+                        </p:par>
+                      </p:childTnLst>
+                    </p:cTn>
+                  </p:par>
+                </p:childTnLst>
+              </p:cTn>
+              <p:prevCondLst>
+                <p:cond evt="onPrev" delay="0">
+                  <p:tgtEl>
+                    <p:sldTgt/>
+                  </p:tgtEl>
+                </p:cond>
+              </p:prevCondLst>
+              <p:nextCondLst>
+                <p:cond evt="onNext" delay="0">
+                  <p:tgtEl>
+                    <p:sldTgt/>
+                  </p:tgtEl>
+                </p:cond>
+              </p:nextCondLst>
+            </p:seq>
+          </p:childTnLst>
+        </p:cTn>
+      </p:par>
+    </p:tnLst>
+  </p:timing>
 </p:sld>
 </file>
 
@@ -10257,7 +11251,667 @@
           <a:bodyPr/>
           <a:lstStyle/>
           <a:p>
-            <a:endParaRPr lang="en-US"/>
+            <a:r>
+              <a:rPr lang="en-US" dirty="0" err="1" smtClean="0"/>
+              <a:t>Warum</a:t>
+            </a:r>
+            <a:r>
+              <a:rPr lang="en-US" dirty="0" smtClean="0"/>
+              <a:t> </a:t>
+            </a:r>
+            <a:r>
+              <a:rPr lang="en-US" dirty="0" err="1" smtClean="0"/>
+              <a:t>ist</a:t>
+            </a:r>
+            <a:r>
+              <a:rPr lang="en-US" dirty="0" smtClean="0"/>
+              <a:t> </a:t>
+            </a:r>
+            <a:r>
+              <a:rPr lang="en-US" dirty="0" err="1" smtClean="0"/>
+              <a:t>hier</a:t>
+            </a:r>
+            <a:r>
+              <a:rPr lang="en-US" dirty="0" smtClean="0"/>
+              <a:t> </a:t>
+            </a:r>
+            <a:r>
+              <a:rPr lang="en-US" dirty="0" err="1" smtClean="0"/>
+              <a:t>const</a:t>
+            </a:r>
+            <a:r>
+              <a:rPr lang="en-US" dirty="0" smtClean="0"/>
+              <a:t> </a:t>
+            </a:r>
+            <a:r>
+              <a:rPr lang="en-US" dirty="0" err="1" smtClean="0"/>
+              <a:t>als</a:t>
+            </a:r>
+            <a:r>
+              <a:rPr lang="en-US" dirty="0" smtClean="0"/>
+              <a:t> </a:t>
+            </a:r>
+            <a:r>
+              <a:rPr lang="en-US" dirty="0" err="1" smtClean="0"/>
+              <a:t>Rückgabewert</a:t>
+            </a:r>
+            <a:r>
+              <a:rPr lang="en-US" dirty="0" smtClean="0"/>
+              <a:t>-Modifier </a:t>
+            </a:r>
+            <a:r>
+              <a:rPr lang="en-US" dirty="0" err="1" smtClean="0"/>
+              <a:t>nicht</a:t>
+            </a:r>
+            <a:r>
+              <a:rPr lang="en-US" dirty="0" smtClean="0"/>
+              <a:t> </a:t>
+            </a:r>
+            <a:r>
+              <a:rPr lang="en-US" dirty="0" err="1" smtClean="0"/>
+              <a:t>sinnvoll</a:t>
+            </a:r>
+            <a:r>
+              <a:rPr lang="en-US" dirty="0" smtClean="0"/>
+              <a:t>?</a:t>
+            </a:r>
+          </a:p>
+          <a:p>
+            <a:endParaRPr lang="en-US" dirty="0"/>
+          </a:p>
+          <a:p>
+            <a:endParaRPr lang="en-US" dirty="0" smtClean="0"/>
+          </a:p>
+          <a:p>
+            <a:endParaRPr lang="en-US" dirty="0"/>
+          </a:p>
+          <a:p>
+            <a:endParaRPr lang="en-US" dirty="0" smtClean="0"/>
+          </a:p>
+          <a:p>
+            <a:endParaRPr lang="en-US" dirty="0"/>
+          </a:p>
+          <a:p>
+            <a:endParaRPr lang="en-US" dirty="0" smtClean="0"/>
+          </a:p>
+          <a:p>
+            <a:endParaRPr lang="en-US" dirty="0"/>
+          </a:p>
+          <a:p>
+            <a:endParaRPr lang="en-US" dirty="0" smtClean="0"/>
+          </a:p>
+          <a:p>
+            <a:endParaRPr lang="en-US" dirty="0"/>
+          </a:p>
+          <a:p>
+            <a:r>
+              <a:rPr lang="en-US" dirty="0" err="1" smtClean="0"/>
+              <a:t>Wiederholung</a:t>
+            </a:r>
+            <a:r>
+              <a:rPr lang="en-US" dirty="0" smtClean="0"/>
+              <a:t>: </a:t>
+            </a:r>
+            <a:r>
+              <a:rPr lang="en-US" dirty="0" err="1" smtClean="0"/>
+              <a:t>Polymorphie</a:t>
+            </a:r>
+            <a:r>
+              <a:rPr lang="en-US" dirty="0" smtClean="0"/>
+              <a:t>?</a:t>
+            </a:r>
+            <a:endParaRPr lang="en-US" dirty="0"/>
+          </a:p>
+        </p:txBody>
+      </p:sp>
+      <p:sp>
+        <p:nvSpPr>
+          <p:cNvPr id="4" name="Inhaltsplatzhalter 2"/>
+          <p:cNvSpPr txBox="1">
+            <a:spLocks/>
+          </p:cNvSpPr>
+          <p:nvPr/>
+        </p:nvSpPr>
+        <p:spPr bwMode="auto">
+          <a:xfrm>
+            <a:off x="363995" y="1988840"/>
+            <a:ext cx="4249167" cy="2550371"/>
+          </a:xfrm>
+          <a:prstGeom prst="foldedCorner">
+            <a:avLst/>
+          </a:prstGeom>
+          <a:noFill/>
+          <a:ln w="9525">
+            <a:solidFill>
+              <a:srgbClr val="000000"/>
+            </a:solidFill>
+            <a:miter lim="800000"/>
+            <a:headEnd/>
+            <a:tailEnd/>
+          </a:ln>
+          <a:extLst>
+            <a:ext uri="{909E8E84-426E-40DD-AFC4-6F175D3DCCD1}">
+              <a14:hiddenFill xmlns:a14="http://schemas.microsoft.com/office/drawing/2010/main">
+                <a:solidFill>
+                  <a:srgbClr val="FFFFFF"/>
+                </a:solidFill>
+              </a14:hiddenFill>
+            </a:ext>
+          </a:extLst>
+        </p:spPr>
+        <p:txBody>
+          <a:bodyPr vert="horz" wrap="square" lIns="91440" tIns="45720" rIns="91440" bIns="45720" numCol="1" anchor="t" anchorCtr="0" compatLnSpc="1">
+            <a:prstTxWarp prst="textNoShape">
+              <a:avLst/>
+            </a:prstTxWarp>
+          </a:bodyPr>
+          <a:lstStyle>
+            <a:lvl1pPr marL="0" indent="0" algn="l" rtl="0" eaLnBrk="0" fontAlgn="base" hangingPunct="0">
+              <a:spcBef>
+                <a:spcPct val="20000"/>
+              </a:spcBef>
+              <a:spcAft>
+                <a:spcPct val="0"/>
+              </a:spcAft>
+              <a:buFont typeface="Wingdings" pitchFamily="2" charset="2"/>
+              <a:buNone/>
+              <a:defRPr sz="2000" b="0">
+                <a:solidFill>
+                  <a:schemeClr val="tx1"/>
+                </a:solidFill>
+                <a:latin typeface="+mn-lt"/>
+                <a:ea typeface="+mn-ea"/>
+                <a:cs typeface="+mn-cs"/>
+              </a:defRPr>
+            </a:lvl1pPr>
+            <a:lvl2pPr marL="349250" indent="-168275" algn="l" rtl="0" eaLnBrk="0" fontAlgn="base" hangingPunct="0">
+              <a:spcBef>
+                <a:spcPct val="20000"/>
+              </a:spcBef>
+              <a:spcAft>
+                <a:spcPct val="0"/>
+              </a:spcAft>
+              <a:buFont typeface="Wingdings" pitchFamily="2" charset="2"/>
+              <a:buChar char="§"/>
+              <a:defRPr>
+                <a:solidFill>
+                  <a:schemeClr val="tx1"/>
+                </a:solidFill>
+                <a:latin typeface="+mn-lt"/>
+              </a:defRPr>
+            </a:lvl2pPr>
+            <a:lvl3pPr marL="538163" indent="-187325" algn="l" rtl="0" eaLnBrk="0" fontAlgn="base" hangingPunct="0">
+              <a:spcBef>
+                <a:spcPct val="20000"/>
+              </a:spcBef>
+              <a:spcAft>
+                <a:spcPct val="0"/>
+              </a:spcAft>
+              <a:buFont typeface="Wingdings" pitchFamily="2" charset="2"/>
+              <a:buChar char="§"/>
+              <a:defRPr>
+                <a:solidFill>
+                  <a:schemeClr val="tx1"/>
+                </a:solidFill>
+                <a:latin typeface="+mn-lt"/>
+              </a:defRPr>
+            </a:lvl3pPr>
+            <a:lvl4pPr marL="717550" indent="-173038" algn="l" rtl="0" eaLnBrk="0" fontAlgn="base" hangingPunct="0">
+              <a:spcBef>
+                <a:spcPct val="20000"/>
+              </a:spcBef>
+              <a:spcAft>
+                <a:spcPct val="0"/>
+              </a:spcAft>
+              <a:buFont typeface="Wingdings" pitchFamily="2" charset="2"/>
+              <a:buChar char="§"/>
+              <a:defRPr sz="1600">
+                <a:solidFill>
+                  <a:schemeClr val="tx1"/>
+                </a:solidFill>
+                <a:latin typeface="+mn-lt"/>
+              </a:defRPr>
+            </a:lvl4pPr>
+            <a:lvl5pPr marL="908050" indent="-188913" algn="l" rtl="0" eaLnBrk="0" fontAlgn="base" hangingPunct="0">
+              <a:spcBef>
+                <a:spcPct val="20000"/>
+              </a:spcBef>
+              <a:spcAft>
+                <a:spcPct val="0"/>
+              </a:spcAft>
+              <a:buFont typeface="Wingdings" pitchFamily="2" charset="2"/>
+              <a:buChar char="§"/>
+              <a:defRPr sz="1600">
+                <a:solidFill>
+                  <a:schemeClr val="tx1"/>
+                </a:solidFill>
+                <a:latin typeface="+mn-lt"/>
+              </a:defRPr>
+            </a:lvl5pPr>
+            <a:lvl6pPr marL="1365250" indent="-188913" algn="l" rtl="0" fontAlgn="base">
+              <a:spcBef>
+                <a:spcPct val="20000"/>
+              </a:spcBef>
+              <a:spcAft>
+                <a:spcPct val="0"/>
+              </a:spcAft>
+              <a:buFont typeface="Wingdings" pitchFamily="2" charset="2"/>
+              <a:buChar char="§"/>
+              <a:defRPr sz="1600">
+                <a:solidFill>
+                  <a:schemeClr val="tx1"/>
+                </a:solidFill>
+                <a:latin typeface="+mn-lt"/>
+              </a:defRPr>
+            </a:lvl6pPr>
+            <a:lvl7pPr marL="1822450" indent="-188913" algn="l" rtl="0" fontAlgn="base">
+              <a:spcBef>
+                <a:spcPct val="20000"/>
+              </a:spcBef>
+              <a:spcAft>
+                <a:spcPct val="0"/>
+              </a:spcAft>
+              <a:buFont typeface="Wingdings" pitchFamily="2" charset="2"/>
+              <a:buChar char="§"/>
+              <a:defRPr sz="1600">
+                <a:solidFill>
+                  <a:schemeClr val="tx1"/>
+                </a:solidFill>
+                <a:latin typeface="+mn-lt"/>
+              </a:defRPr>
+            </a:lvl7pPr>
+            <a:lvl8pPr marL="2279650" indent="-188913" algn="l" rtl="0" fontAlgn="base">
+              <a:spcBef>
+                <a:spcPct val="20000"/>
+              </a:spcBef>
+              <a:spcAft>
+                <a:spcPct val="0"/>
+              </a:spcAft>
+              <a:buFont typeface="Wingdings" pitchFamily="2" charset="2"/>
+              <a:buChar char="§"/>
+              <a:defRPr sz="1600">
+                <a:solidFill>
+                  <a:schemeClr val="tx1"/>
+                </a:solidFill>
+                <a:latin typeface="+mn-lt"/>
+              </a:defRPr>
+            </a:lvl8pPr>
+            <a:lvl9pPr marL="2736850" indent="-188913" algn="l" rtl="0" fontAlgn="base">
+              <a:spcBef>
+                <a:spcPct val="20000"/>
+              </a:spcBef>
+              <a:spcAft>
+                <a:spcPct val="0"/>
+              </a:spcAft>
+              <a:buFont typeface="Wingdings" pitchFamily="2" charset="2"/>
+              <a:buChar char="§"/>
+              <a:defRPr sz="1600">
+                <a:solidFill>
+                  <a:schemeClr val="tx1"/>
+                </a:solidFill>
+                <a:latin typeface="+mn-lt"/>
+              </a:defRPr>
+            </a:lvl9pPr>
+          </a:lstStyle>
+          <a:p>
+            <a:pPr defTabSz="914400">
+              <a:lnSpc>
+                <a:spcPct val="100000"/>
+              </a:lnSpc>
+              <a:buClrTx/>
+              <a:buSzTx/>
+              <a:tabLst>
+                <a:tab pos="533400" algn="l"/>
+              </a:tabLst>
+            </a:pPr>
+            <a:r>
+              <a:rPr lang="en-US" sz="1600" b="1" kern="0" dirty="0" err="1" smtClean="0">
+                <a:solidFill>
+                  <a:srgbClr val="7F0055"/>
+                </a:solidFill>
+                <a:latin typeface="Consolas" panose="020B0609020204030204" pitchFamily="49" charset="0"/>
+                <a:cs typeface="Consolas" panose="020B0609020204030204" pitchFamily="49" charset="0"/>
+              </a:rPr>
+              <a:t>const</a:t>
+            </a:r>
+            <a:r>
+              <a:rPr lang="en-US" sz="1600" b="1" kern="0" dirty="0" smtClean="0">
+                <a:solidFill>
+                  <a:srgbClr val="7F0055"/>
+                </a:solidFill>
+                <a:latin typeface="Consolas" panose="020B0609020204030204" pitchFamily="49" charset="0"/>
+                <a:cs typeface="Consolas" panose="020B0609020204030204" pitchFamily="49" charset="0"/>
+              </a:rPr>
+              <a:t> </a:t>
+            </a:r>
+            <a:r>
+              <a:rPr lang="en-US" sz="1600" b="1" kern="0" dirty="0" err="1" smtClean="0">
+                <a:solidFill>
+                  <a:srgbClr val="7F0055"/>
+                </a:solidFill>
+                <a:latin typeface="Consolas" panose="020B0609020204030204" pitchFamily="49" charset="0"/>
+                <a:cs typeface="Consolas" panose="020B0609020204030204" pitchFamily="49" charset="0"/>
+              </a:rPr>
+              <a:t>int</a:t>
+            </a:r>
+            <a:r>
+              <a:rPr lang="en-US" sz="1600" b="1" kern="0" dirty="0" smtClean="0">
+                <a:solidFill>
+                  <a:srgbClr val="7F0055"/>
+                </a:solidFill>
+                <a:latin typeface="Consolas" panose="020B0609020204030204" pitchFamily="49" charset="0"/>
+                <a:cs typeface="Consolas" panose="020B0609020204030204" pitchFamily="49" charset="0"/>
+              </a:rPr>
+              <a:t> </a:t>
+            </a:r>
+            <a:r>
+              <a:rPr lang="en-US" sz="1600" b="1" kern="0" dirty="0" err="1" smtClean="0">
+                <a:solidFill>
+                  <a:srgbClr val="000000"/>
+                </a:solidFill>
+                <a:latin typeface="Consolas" panose="020B0609020204030204" pitchFamily="49" charset="0"/>
+                <a:cs typeface="Consolas" panose="020B0609020204030204" pitchFamily="49" charset="0"/>
+              </a:rPr>
+              <a:t>myFunction</a:t>
+            </a:r>
+            <a:r>
+              <a:rPr lang="en-US" sz="1600" b="1" kern="0" dirty="0" smtClean="0">
+                <a:solidFill>
+                  <a:srgbClr val="000000"/>
+                </a:solidFill>
+                <a:latin typeface="Consolas" panose="020B0609020204030204" pitchFamily="49" charset="0"/>
+                <a:cs typeface="Consolas" panose="020B0609020204030204" pitchFamily="49" charset="0"/>
+              </a:rPr>
+              <a:t>(</a:t>
+            </a:r>
+            <a:r>
+              <a:rPr lang="en-US" sz="1600" b="1" kern="0" dirty="0" smtClean="0">
+                <a:solidFill>
+                  <a:srgbClr val="005032"/>
+                </a:solidFill>
+                <a:latin typeface="Consolas" panose="020B0609020204030204" pitchFamily="49" charset="0"/>
+                <a:cs typeface="Consolas" panose="020B0609020204030204" pitchFamily="49" charset="0"/>
+              </a:rPr>
+              <a:t>C</a:t>
+            </a:r>
+            <a:r>
+              <a:rPr lang="en-US" sz="1600" b="1" kern="0" dirty="0" smtClean="0">
+                <a:solidFill>
+                  <a:srgbClr val="000000"/>
+                </a:solidFill>
+                <a:latin typeface="Consolas" panose="020B0609020204030204" pitchFamily="49" charset="0"/>
+                <a:cs typeface="Consolas" panose="020B0609020204030204" pitchFamily="49" charset="0"/>
+              </a:rPr>
+              <a:t> c) {</a:t>
+            </a:r>
+          </a:p>
+          <a:p>
+            <a:pPr defTabSz="914400">
+              <a:lnSpc>
+                <a:spcPct val="100000"/>
+              </a:lnSpc>
+              <a:buClrTx/>
+              <a:buSzTx/>
+              <a:tabLst>
+                <a:tab pos="533400" algn="l"/>
+              </a:tabLst>
+            </a:pPr>
+            <a:r>
+              <a:rPr lang="en-US" sz="1600" kern="0" dirty="0">
+                <a:solidFill>
+                  <a:srgbClr val="000000"/>
+                </a:solidFill>
+                <a:latin typeface="Consolas" panose="020B0609020204030204" pitchFamily="49" charset="0"/>
+                <a:cs typeface="Consolas" panose="020B0609020204030204" pitchFamily="49" charset="0"/>
+              </a:rPr>
+              <a:t>	</a:t>
+            </a:r>
+            <a:r>
+              <a:rPr lang="en-US" sz="1600" b="1" kern="0" dirty="0" smtClean="0">
+                <a:solidFill>
+                  <a:srgbClr val="7F0055"/>
+                </a:solidFill>
+                <a:latin typeface="Consolas" panose="020B0609020204030204" pitchFamily="49" charset="0"/>
+                <a:cs typeface="Consolas" panose="020B0609020204030204" pitchFamily="49" charset="0"/>
+              </a:rPr>
+              <a:t>return</a:t>
+            </a:r>
+            <a:r>
+              <a:rPr lang="en-US" sz="1600" b="1" kern="0" dirty="0" smtClean="0">
+                <a:solidFill>
+                  <a:srgbClr val="000000"/>
+                </a:solidFill>
+                <a:latin typeface="Consolas" panose="020B0609020204030204" pitchFamily="49" charset="0"/>
+                <a:cs typeface="Consolas" panose="020B0609020204030204" pitchFamily="49" charset="0"/>
+              </a:rPr>
+              <a:t> -13;</a:t>
+            </a:r>
+          </a:p>
+          <a:p>
+            <a:pPr defTabSz="914400">
+              <a:lnSpc>
+                <a:spcPct val="100000"/>
+              </a:lnSpc>
+              <a:buClrTx/>
+              <a:buSzTx/>
+              <a:tabLst>
+                <a:tab pos="533400" algn="l"/>
+              </a:tabLst>
+            </a:pPr>
+            <a:r>
+              <a:rPr lang="en-US" sz="1600" kern="0" dirty="0" smtClean="0">
+                <a:solidFill>
+                  <a:srgbClr val="000000"/>
+                </a:solidFill>
+                <a:latin typeface="Consolas" panose="020B0609020204030204" pitchFamily="49" charset="0"/>
+                <a:cs typeface="Consolas" panose="020B0609020204030204" pitchFamily="49" charset="0"/>
+              </a:rPr>
+              <a:t>}</a:t>
+            </a:r>
+          </a:p>
+          <a:p>
+            <a:pPr defTabSz="914400">
+              <a:lnSpc>
+                <a:spcPct val="100000"/>
+              </a:lnSpc>
+              <a:buClrTx/>
+              <a:buSzTx/>
+              <a:tabLst>
+                <a:tab pos="533400" algn="l"/>
+              </a:tabLst>
+            </a:pPr>
+            <a:endParaRPr lang="en-US" sz="1600" kern="0" dirty="0" smtClean="0">
+              <a:latin typeface="Consolas" panose="020B0609020204030204" pitchFamily="49" charset="0"/>
+              <a:cs typeface="Consolas" panose="020B0609020204030204" pitchFamily="49" charset="0"/>
+            </a:endParaRPr>
+          </a:p>
+          <a:p>
+            <a:pPr defTabSz="914400">
+              <a:lnSpc>
+                <a:spcPct val="100000"/>
+              </a:lnSpc>
+              <a:buClrTx/>
+              <a:buSzTx/>
+              <a:tabLst>
+                <a:tab pos="533400" algn="l"/>
+              </a:tabLst>
+            </a:pPr>
+            <a:r>
+              <a:rPr lang="en-US" sz="1600" b="1" kern="0" dirty="0" err="1" smtClean="0">
+                <a:solidFill>
+                  <a:srgbClr val="7F0055"/>
+                </a:solidFill>
+                <a:latin typeface="Consolas" panose="020B0609020204030204" pitchFamily="49" charset="0"/>
+                <a:cs typeface="Consolas" panose="020B0609020204030204" pitchFamily="49" charset="0"/>
+              </a:rPr>
+              <a:t>int</a:t>
+            </a:r>
+            <a:r>
+              <a:rPr lang="en-US" sz="1600" b="1" kern="0" dirty="0" smtClean="0">
+                <a:solidFill>
+                  <a:srgbClr val="000000"/>
+                </a:solidFill>
+                <a:latin typeface="Consolas" panose="020B0609020204030204" pitchFamily="49" charset="0"/>
+                <a:cs typeface="Consolas" panose="020B0609020204030204" pitchFamily="49" charset="0"/>
+              </a:rPr>
+              <a:t> main() {</a:t>
+            </a:r>
+          </a:p>
+          <a:p>
+            <a:pPr defTabSz="914400">
+              <a:lnSpc>
+                <a:spcPct val="100000"/>
+              </a:lnSpc>
+              <a:buClrTx/>
+              <a:buSzTx/>
+              <a:tabLst>
+                <a:tab pos="533400" algn="l"/>
+              </a:tabLst>
+            </a:pPr>
+            <a:r>
+              <a:rPr lang="en-US" sz="1600" kern="0" dirty="0" smtClean="0">
+                <a:solidFill>
+                  <a:srgbClr val="000000"/>
+                </a:solidFill>
+                <a:latin typeface="Consolas" panose="020B0609020204030204" pitchFamily="49" charset="0"/>
+                <a:cs typeface="Consolas" panose="020B0609020204030204" pitchFamily="49" charset="0"/>
+              </a:rPr>
+              <a:t>	</a:t>
+            </a:r>
+            <a:r>
+              <a:rPr lang="en-US" sz="1600" b="1" dirty="0" err="1" smtClean="0">
+                <a:solidFill>
+                  <a:srgbClr val="7F0055"/>
+                </a:solidFill>
+                <a:latin typeface="Consolas" panose="020B0609020204030204" pitchFamily="49" charset="0"/>
+                <a:cs typeface="Consolas" panose="020B0609020204030204" pitchFamily="49" charset="0"/>
+              </a:rPr>
+              <a:t>int</a:t>
+            </a:r>
+            <a:r>
+              <a:rPr lang="en-US" sz="1600" b="1" dirty="0" smtClean="0">
+                <a:solidFill>
+                  <a:srgbClr val="000000"/>
+                </a:solidFill>
+                <a:latin typeface="Consolas" panose="020B0609020204030204" pitchFamily="49" charset="0"/>
+                <a:cs typeface="Consolas" panose="020B0609020204030204" pitchFamily="49" charset="0"/>
+              </a:rPr>
+              <a:t> </a:t>
+            </a:r>
+            <a:r>
+              <a:rPr lang="en-US" sz="1600" b="1" dirty="0" err="1" smtClean="0">
+                <a:solidFill>
+                  <a:srgbClr val="0000C0"/>
+                </a:solidFill>
+                <a:latin typeface="Consolas" panose="020B0609020204030204" pitchFamily="49" charset="0"/>
+                <a:cs typeface="Consolas" panose="020B0609020204030204" pitchFamily="49" charset="0"/>
+              </a:rPr>
+              <a:t>i</a:t>
+            </a:r>
+            <a:r>
+              <a:rPr lang="en-US" sz="1600" b="1" dirty="0" smtClean="0">
+                <a:solidFill>
+                  <a:srgbClr val="0000C0"/>
+                </a:solidFill>
+                <a:latin typeface="Consolas" panose="020B0609020204030204" pitchFamily="49" charset="0"/>
+                <a:cs typeface="Consolas" panose="020B0609020204030204" pitchFamily="49" charset="0"/>
+              </a:rPr>
+              <a:t> = </a:t>
+            </a:r>
+            <a:r>
+              <a:rPr lang="en-US" sz="1600" kern="0" dirty="0" err="1" smtClean="0">
+                <a:solidFill>
+                  <a:srgbClr val="000000"/>
+                </a:solidFill>
+                <a:latin typeface="Consolas" panose="020B0609020204030204" pitchFamily="49" charset="0"/>
+                <a:cs typeface="Consolas" panose="020B0609020204030204" pitchFamily="49" charset="0"/>
+              </a:rPr>
+              <a:t>myFunction</a:t>
+            </a:r>
+            <a:r>
+              <a:rPr lang="en-US" sz="1600" kern="0" dirty="0" smtClean="0">
+                <a:solidFill>
+                  <a:srgbClr val="000000"/>
+                </a:solidFill>
+                <a:latin typeface="Consolas" panose="020B0609020204030204" pitchFamily="49" charset="0"/>
+                <a:cs typeface="Consolas" panose="020B0609020204030204" pitchFamily="49" charset="0"/>
+              </a:rPr>
+              <a:t>(3);</a:t>
+            </a:r>
+            <a:endParaRPr lang="en-US" sz="1600" kern="0" dirty="0" smtClean="0">
+              <a:latin typeface="Consolas" panose="020B0609020204030204" pitchFamily="49" charset="0"/>
+              <a:cs typeface="Consolas" panose="020B0609020204030204" pitchFamily="49" charset="0"/>
+            </a:endParaRPr>
+          </a:p>
+          <a:p>
+            <a:pPr defTabSz="914400">
+              <a:lnSpc>
+                <a:spcPct val="100000"/>
+              </a:lnSpc>
+              <a:buClrTx/>
+              <a:buSzTx/>
+              <a:tabLst>
+                <a:tab pos="533400" algn="l"/>
+              </a:tabLst>
+            </a:pPr>
+            <a:r>
+              <a:rPr lang="en-US" sz="1600" b="1" kern="0" dirty="0" smtClean="0">
+                <a:solidFill>
+                  <a:srgbClr val="7F0055"/>
+                </a:solidFill>
+                <a:latin typeface="Consolas" panose="020B0609020204030204" pitchFamily="49" charset="0"/>
+                <a:cs typeface="Consolas" panose="020B0609020204030204" pitchFamily="49" charset="0"/>
+              </a:rPr>
+              <a:t>	return</a:t>
+            </a:r>
+            <a:r>
+              <a:rPr lang="en-US" sz="1600" b="1" kern="0" dirty="0" smtClean="0">
+                <a:solidFill>
+                  <a:srgbClr val="000000"/>
+                </a:solidFill>
+                <a:latin typeface="Consolas" panose="020B0609020204030204" pitchFamily="49" charset="0"/>
+                <a:cs typeface="Consolas" panose="020B0609020204030204" pitchFamily="49" charset="0"/>
+              </a:rPr>
+              <a:t> 0;</a:t>
+            </a:r>
+          </a:p>
+          <a:p>
+            <a:pPr defTabSz="914400">
+              <a:lnSpc>
+                <a:spcPct val="100000"/>
+              </a:lnSpc>
+              <a:buClrTx/>
+              <a:buSzTx/>
+              <a:tabLst>
+                <a:tab pos="533400" algn="l"/>
+              </a:tabLst>
+            </a:pPr>
+            <a:r>
+              <a:rPr lang="en-US" sz="1600" kern="0" dirty="0" smtClean="0">
+                <a:solidFill>
+                  <a:srgbClr val="000000"/>
+                </a:solidFill>
+                <a:latin typeface="Consolas" panose="020B0609020204030204" pitchFamily="49" charset="0"/>
+                <a:cs typeface="Consolas" panose="020B0609020204030204" pitchFamily="49" charset="0"/>
+              </a:rPr>
+              <a:t>}</a:t>
+            </a:r>
+          </a:p>
+          <a:p>
+            <a:pPr defTabSz="914400">
+              <a:lnSpc>
+                <a:spcPct val="100000"/>
+              </a:lnSpc>
+              <a:buClrTx/>
+              <a:buSzTx/>
+              <a:tabLst>
+                <a:tab pos="533400" algn="l"/>
+              </a:tabLst>
+            </a:pPr>
+            <a:endParaRPr lang="en-US" sz="1600" kern="0" dirty="0">
+              <a:latin typeface="Consolas" panose="020B0609020204030204" pitchFamily="49" charset="0"/>
+              <a:cs typeface="Consolas" panose="020B0609020204030204" pitchFamily="49" charset="0"/>
+            </a:endParaRPr>
           </a:p>
         </p:txBody>
       </p:sp>
@@ -10271,6 +11925,13 @@
   <p:clrMapOvr>
     <a:masterClrMapping/>
   </p:clrMapOvr>
+  <p:timing>
+    <p:tnLst>
+      <p:par>
+        <p:cTn id="1" dur="indefinite" restart="never" nodeType="tmRoot"/>
+      </p:par>
+    </p:tnLst>
+  </p:timing>
 </p:sld>
 </file>
 

</xml_diff>

<commit_message>
Zusatzfragen für die Evaluation
</commit_message>
<xml_diff>
--- a/2015/recap_and_warmup_slides.pptx
+++ b/2015/recap_and_warmup_slides.pptx
@@ -5,10 +5,10 @@
     <p:sldMasterId id="2147483650" r:id="rId1"/>
   </p:sldMasterIdLst>
   <p:notesMasterIdLst>
-    <p:notesMasterId r:id="rId9"/>
+    <p:notesMasterId r:id="rId10"/>
   </p:notesMasterIdLst>
   <p:handoutMasterIdLst>
-    <p:handoutMasterId r:id="rId10"/>
+    <p:handoutMasterId r:id="rId11"/>
   </p:handoutMasterIdLst>
   <p:sldIdLst>
     <p:sldId id="454" r:id="rId2"/>
@@ -18,6 +18,7 @@
     <p:sldId id="458" r:id="rId6"/>
     <p:sldId id="459" r:id="rId7"/>
     <p:sldId id="460" r:id="rId8"/>
+    <p:sldId id="461" r:id="rId9"/>
   </p:sldIdLst>
   <p:sldSz cx="9144000" cy="6858000" type="screen4x3"/>
   <p:notesSz cx="7099300" cy="10234613"/>
@@ -198,6 +199,7 @@
             <p14:sldId id="458"/>
             <p14:sldId id="459"/>
             <p14:sldId id="460"/>
+            <p14:sldId id="461"/>
           </p14:sldIdLst>
         </p14:section>
       </p14:sectionLst>
@@ -6109,7 +6111,7 @@
           <a:graphicData uri="http://schemas.openxmlformats.org/presentationml/2006/ole">
             <mc:AlternateContent xmlns:mc="http://schemas.openxmlformats.org/markup-compatibility/2006">
               <mc:Choice xmlns:v="urn:schemas-microsoft-com:vml" Requires="v">
-                <p:oleObj spid="_x0000_s1886" r:id="rId15" imgW="1038370" imgH="980952" progId="">
+                <p:oleObj spid="_x0000_s1889" r:id="rId15" imgW="1038370" imgH="980952" progId="">
                   <p:embed/>
                 </p:oleObj>
               </mc:Choice>
@@ -11919,6 +11921,147 @@
     <p:extLst>
       <p:ext uri="{BB962C8B-B14F-4D97-AF65-F5344CB8AC3E}">
         <p14:creationId xmlns:p14="http://schemas.microsoft.com/office/powerpoint/2010/main" val="1539827024"/>
+      </p:ext>
+    </p:extLst>
+  </p:cSld>
+  <p:clrMapOvr>
+    <a:masterClrMapping/>
+  </p:clrMapOvr>
+  <p:timing>
+    <p:tnLst>
+      <p:par>
+        <p:cTn id="1" dur="indefinite" restart="never" nodeType="tmRoot"/>
+      </p:par>
+    </p:tnLst>
+  </p:timing>
+</p:sld>
+</file>
+
+<file path=ppt/slides/slide8.xml><?xml version="1.0" encoding="utf-8"?>
+<p:sld xmlns:a="http://schemas.openxmlformats.org/drawingml/2006/main" xmlns:r="http://schemas.openxmlformats.org/officeDocument/2006/relationships" xmlns:p="http://schemas.openxmlformats.org/presentationml/2006/main">
+  <p:cSld>
+    <p:spTree>
+      <p:nvGrpSpPr>
+        <p:cNvPr id="1" name=""/>
+        <p:cNvGrpSpPr/>
+        <p:nvPr/>
+      </p:nvGrpSpPr>
+      <p:grpSpPr>
+        <a:xfrm>
+          <a:off x="0" y="0"/>
+          <a:ext cx="0" cy="0"/>
+          <a:chOff x="0" y="0"/>
+          <a:chExt cx="0" cy="0"/>
+        </a:xfrm>
+      </p:grpSpPr>
+      <p:sp>
+        <p:nvSpPr>
+          <p:cNvPr id="2" name="Titel 1"/>
+          <p:cNvSpPr>
+            <a:spLocks noGrp="1"/>
+          </p:cNvSpPr>
+          <p:nvPr>
+            <p:ph type="title"/>
+          </p:nvPr>
+        </p:nvSpPr>
+        <p:spPr/>
+        <p:txBody>
+          <a:bodyPr/>
+          <a:lstStyle/>
+          <a:p>
+            <a:r>
+              <a:rPr lang="en-US" dirty="0" smtClean="0"/>
+              <a:t>Tag 5: </a:t>
+            </a:r>
+            <a:r>
+              <a:rPr lang="en-US" dirty="0" err="1" smtClean="0"/>
+              <a:t>Rückschau</a:t>
+            </a:r>
+            <a:r>
+              <a:rPr lang="en-US" dirty="0" smtClean="0"/>
+              <a:t> und Warm Up</a:t>
+            </a:r>
+            <a:endParaRPr lang="en-US" dirty="0"/>
+          </a:p>
+        </p:txBody>
+      </p:sp>
+      <p:sp>
+        <p:nvSpPr>
+          <p:cNvPr id="3" name="Inhaltsplatzhalter 2"/>
+          <p:cNvSpPr>
+            <a:spLocks noGrp="1"/>
+          </p:cNvSpPr>
+          <p:nvPr>
+            <p:ph idx="1"/>
+          </p:nvPr>
+        </p:nvSpPr>
+        <p:spPr/>
+        <p:txBody>
+          <a:bodyPr/>
+          <a:lstStyle/>
+          <a:p>
+            <a:r>
+              <a:rPr lang="en-US" dirty="0" err="1" smtClean="0"/>
+              <a:t>Empfohlener</a:t>
+            </a:r>
+            <a:r>
+              <a:rPr lang="en-US" dirty="0" smtClean="0"/>
+              <a:t> </a:t>
+            </a:r>
+            <a:r>
+              <a:rPr lang="en-US" dirty="0" err="1" smtClean="0"/>
+              <a:t>Artikel</a:t>
+            </a:r>
+            <a:r>
+              <a:rPr lang="en-US" dirty="0" smtClean="0"/>
+              <a:t> </a:t>
+            </a:r>
+            <a:r>
+              <a:rPr lang="en-US" dirty="0" err="1" smtClean="0"/>
+              <a:t>zur</a:t>
+            </a:r>
+            <a:r>
+              <a:rPr lang="en-US" dirty="0" smtClean="0"/>
+              <a:t> </a:t>
+            </a:r>
+            <a:r>
+              <a:rPr lang="en-US" i="1" dirty="0" err="1" smtClean="0"/>
+              <a:t>Const</a:t>
+            </a:r>
+            <a:r>
+              <a:rPr lang="en-US" i="1" dirty="0" smtClean="0"/>
+              <a:t> Correctness</a:t>
+            </a:r>
+            <a:r>
+              <a:rPr lang="en-US" dirty="0" smtClean="0"/>
+              <a:t>:</a:t>
+            </a:r>
+          </a:p>
+          <a:p>
+            <a:r>
+              <a:rPr lang="en-US" dirty="0">
+                <a:hlinkClick r:id="rId2"/>
+              </a:rPr>
+              <a:t>https://</a:t>
+            </a:r>
+            <a:r>
+              <a:rPr lang="en-US" dirty="0" smtClean="0">
+                <a:hlinkClick r:id="rId2"/>
+              </a:rPr>
+              <a:t>isocpp.org/wiki/faq/const-correctness</a:t>
+            </a:r>
+            <a:r>
+              <a:rPr lang="en-US" dirty="0" smtClean="0"/>
+              <a:t> </a:t>
+            </a:r>
+            <a:endParaRPr lang="en-US" dirty="0"/>
+          </a:p>
+        </p:txBody>
+      </p:sp>
+    </p:spTree>
+    <p:extLst>
+      <p:ext uri="{BB962C8B-B14F-4D97-AF65-F5344CB8AC3E}">
+        <p14:creationId xmlns:p14="http://schemas.microsoft.com/office/powerpoint/2010/main" val="224661779"/>
       </p:ext>
     </p:extLst>
   </p:cSld>

</xml_diff>

<commit_message>
Final corrections for first turn
</commit_message>
<xml_diff>
--- a/2015/recap_and_warmup_slides.pptx
+++ b/2015/recap_and_warmup_slides.pptx
@@ -6113,7 +6113,7 @@
           <a:graphicData uri="http://schemas.openxmlformats.org/presentationml/2006/ole">
             <mc:AlternateContent xmlns:mc="http://schemas.openxmlformats.org/markup-compatibility/2006">
               <mc:Choice xmlns:v="urn:schemas-microsoft-com:vml" Requires="v">
-                <p:oleObj spid="_x0000_s1913" r:id="rId15" imgW="1038370" imgH="980952" progId="">
+                <p:oleObj spid="_x0000_s1914" r:id="rId15" imgW="1038370" imgH="980952" progId="">
                   <p:embed/>
                 </p:oleObj>
               </mc:Choice>
@@ -12019,7 +12019,7 @@
               <a:t> Tag 4: </a:t>
             </a:r>
             <a:r>
-              <a:rPr lang="en-US" b="1" dirty="0" smtClean="0"/>
+              <a:rPr lang="en-US" sz="3600" b="1" dirty="0" smtClean="0"/>
               <a:t>4</a:t>
             </a:r>
             <a:r>
@@ -12246,7 +12246,7 @@
         </p:blipFill>
         <p:spPr>
           <a:xfrm>
-            <a:off x="4067944" y="1492764"/>
+            <a:off x="7308528" y="1561081"/>
             <a:ext cx="1295449" cy="1381556"/>
           </a:xfrm>
           <a:prstGeom prst="rect">
@@ -12277,8 +12277,8 @@
         </p:blipFill>
         <p:spPr bwMode="auto">
           <a:xfrm>
-            <a:off x="5652120" y="4203316"/>
-            <a:ext cx="2999829" cy="2249872"/>
+            <a:off x="5867673" y="4400960"/>
+            <a:ext cx="2736304" cy="2052228"/>
           </a:xfrm>
           <a:prstGeom prst="rect">
             <a:avLst/>

</xml_diff>